<commit_message>
Added Java code example
</commit_message>
<xml_diff>
--- a/NotesAndSlides/CIS399Wk4Day1-WebServices+REST.pptx
+++ b/NotesAndSlides/CIS399Wk4Day1-WebServices+REST.pptx
@@ -5,7 +5,7 @@
     <p:sldMasterId id="2147483648" r:id="rId1"/>
   </p:sldMasterIdLst>
   <p:notesMasterIdLst>
-    <p:notesMasterId r:id="rId16"/>
+    <p:notesMasterId r:id="rId19"/>
   </p:notesMasterIdLst>
   <p:sldIdLst>
     <p:sldId id="269" r:id="rId2"/>
@@ -21,7 +21,10 @@
     <p:sldId id="456" r:id="rId12"/>
     <p:sldId id="448" r:id="rId13"/>
     <p:sldId id="457" r:id="rId14"/>
-    <p:sldId id="392" r:id="rId15"/>
+    <p:sldId id="458" r:id="rId15"/>
+    <p:sldId id="460" r:id="rId16"/>
+    <p:sldId id="459" r:id="rId17"/>
+    <p:sldId id="392" r:id="rId18"/>
   </p:sldIdLst>
   <p:sldSz cx="9144000" cy="6858000" type="screen4x3"/>
   <p:notesSz cx="6858000" cy="9144000"/>
@@ -563,6 +566,316 @@
     <p:extLst>
       <p:ext uri="{BB962C8B-B14F-4D97-AF65-F5344CB8AC3E}">
         <p14:creationId xmlns:p14="http://schemas.microsoft.com/office/powerpoint/2010/main" val="883401808"/>
+      </p:ext>
+    </p:extLst>
+  </p:cSld>
+  <p:clrMapOvr>
+    <a:masterClrMapping/>
+  </p:clrMapOvr>
+</p:notes>
+</file>
+
+<file path=ppt/notesSlides/notesSlide10.xml><?xml version="1.0" encoding="utf-8"?>
+<p:notes xmlns:a="http://schemas.openxmlformats.org/drawingml/2006/main" xmlns:r="http://schemas.openxmlformats.org/officeDocument/2006/relationships" xmlns:p="http://schemas.openxmlformats.org/presentationml/2006/main">
+  <p:cSld>
+    <p:spTree>
+      <p:nvGrpSpPr>
+        <p:cNvPr id="1" name=""/>
+        <p:cNvGrpSpPr/>
+        <p:nvPr/>
+      </p:nvGrpSpPr>
+      <p:grpSpPr>
+        <a:xfrm>
+          <a:off x="0" y="0"/>
+          <a:ext cx="0" cy="0"/>
+          <a:chOff x="0" y="0"/>
+          <a:chExt cx="0" cy="0"/>
+        </a:xfrm>
+      </p:grpSpPr>
+      <p:sp>
+        <p:nvSpPr>
+          <p:cNvPr id="2" name="Slide Image Placeholder 1"/>
+          <p:cNvSpPr>
+            <a:spLocks noGrp="1" noRot="1" noChangeAspect="1"/>
+          </p:cNvSpPr>
+          <p:nvPr>
+            <p:ph type="sldImg"/>
+          </p:nvPr>
+        </p:nvSpPr>
+        <p:spPr/>
+      </p:sp>
+      <p:sp>
+        <p:nvSpPr>
+          <p:cNvPr id="3" name="Notes Placeholder 2"/>
+          <p:cNvSpPr>
+            <a:spLocks noGrp="1"/>
+          </p:cNvSpPr>
+          <p:nvPr>
+            <p:ph type="body" idx="1"/>
+          </p:nvPr>
+        </p:nvSpPr>
+        <p:spPr/>
+        <p:txBody>
+          <a:bodyPr/>
+          <a:lstStyle/>
+          <a:p>
+            <a:endParaRPr lang="en-US" dirty="0"/>
+          </a:p>
+        </p:txBody>
+      </p:sp>
+      <p:sp>
+        <p:nvSpPr>
+          <p:cNvPr id="4" name="Slide Number Placeholder 3"/>
+          <p:cNvSpPr>
+            <a:spLocks noGrp="1"/>
+          </p:cNvSpPr>
+          <p:nvPr>
+            <p:ph type="sldNum" sz="quarter" idx="10"/>
+          </p:nvPr>
+        </p:nvSpPr>
+        <p:spPr/>
+        <p:txBody>
+          <a:bodyPr/>
+          <a:lstStyle/>
+          <a:p>
+            <a:fld id="{44EB6C7D-DFD8-944D-93E3-D07F7EBDDEA8}" type="slidenum">
+              <a:rPr lang="en-US" smtClean="0"/>
+              <a:t>14</a:t>
+            </a:fld>
+            <a:endParaRPr lang="en-US"/>
+          </a:p>
+        </p:txBody>
+      </p:sp>
+    </p:spTree>
+    <p:extLst>
+      <p:ext uri="{BB962C8B-B14F-4D97-AF65-F5344CB8AC3E}">
+        <p14:creationId xmlns:p14="http://schemas.microsoft.com/office/powerpoint/2010/main" val="3525967319"/>
+      </p:ext>
+    </p:extLst>
+  </p:cSld>
+  <p:clrMapOvr>
+    <a:masterClrMapping/>
+  </p:clrMapOvr>
+</p:notes>
+</file>
+
+<file path=ppt/notesSlides/notesSlide11.xml><?xml version="1.0" encoding="utf-8"?>
+<p:notes xmlns:a="http://schemas.openxmlformats.org/drawingml/2006/main" xmlns:r="http://schemas.openxmlformats.org/officeDocument/2006/relationships" xmlns:p="http://schemas.openxmlformats.org/presentationml/2006/main">
+  <p:cSld>
+    <p:spTree>
+      <p:nvGrpSpPr>
+        <p:cNvPr id="1" name=""/>
+        <p:cNvGrpSpPr/>
+        <p:nvPr/>
+      </p:nvGrpSpPr>
+      <p:grpSpPr>
+        <a:xfrm>
+          <a:off x="0" y="0"/>
+          <a:ext cx="0" cy="0"/>
+          <a:chOff x="0" y="0"/>
+          <a:chExt cx="0" cy="0"/>
+        </a:xfrm>
+      </p:grpSpPr>
+      <p:sp>
+        <p:nvSpPr>
+          <p:cNvPr id="2" name="Slide Image Placeholder 1"/>
+          <p:cNvSpPr>
+            <a:spLocks noGrp="1" noRot="1" noChangeAspect="1"/>
+          </p:cNvSpPr>
+          <p:nvPr>
+            <p:ph type="sldImg"/>
+          </p:nvPr>
+        </p:nvSpPr>
+        <p:spPr/>
+      </p:sp>
+      <p:sp>
+        <p:nvSpPr>
+          <p:cNvPr id="3" name="Notes Placeholder 2"/>
+          <p:cNvSpPr>
+            <a:spLocks noGrp="1"/>
+          </p:cNvSpPr>
+          <p:nvPr>
+            <p:ph type="body" idx="1"/>
+          </p:nvPr>
+        </p:nvSpPr>
+        <p:spPr/>
+        <p:txBody>
+          <a:bodyPr/>
+          <a:lstStyle/>
+          <a:p>
+            <a:pPr marL="0" marR="0" lvl="0" indent="0" algn="l" defTabSz="457200" rtl="0" eaLnBrk="1" fontAlgn="auto" latinLnBrk="0" hangingPunct="1">
+              <a:lnSpc>
+                <a:spcPct val="100000"/>
+              </a:lnSpc>
+              <a:spcBef>
+                <a:spcPts val="0"/>
+              </a:spcBef>
+              <a:spcAft>
+                <a:spcPts val="0"/>
+              </a:spcAft>
+              <a:buClrTx/>
+              <a:buSzTx/>
+              <a:buFontTx/>
+              <a:buNone/>
+              <a:tabLst/>
+              <a:defRPr/>
+            </a:pPr>
+            <a:r>
+              <a:rPr lang="en-US" sz="1200" dirty="0">
+                <a:hlinkClick r:id="rId3"/>
+              </a:rPr>
+              <a:t>http://api.wunderground.com/weather/api/d/docs</a:t>
+            </a:r>
+            <a:r>
+              <a:rPr lang="en-US" sz="1200" dirty="0"/>
+              <a:t> </a:t>
+            </a:r>
+          </a:p>
+          <a:p>
+            <a:endParaRPr lang="en-US" dirty="0"/>
+          </a:p>
+        </p:txBody>
+      </p:sp>
+      <p:sp>
+        <p:nvSpPr>
+          <p:cNvPr id="4" name="Slide Number Placeholder 3"/>
+          <p:cNvSpPr>
+            <a:spLocks noGrp="1"/>
+          </p:cNvSpPr>
+          <p:nvPr>
+            <p:ph type="sldNum" sz="quarter" idx="10"/>
+          </p:nvPr>
+        </p:nvSpPr>
+        <p:spPr/>
+        <p:txBody>
+          <a:bodyPr/>
+          <a:lstStyle/>
+          <a:p>
+            <a:fld id="{44EB6C7D-DFD8-944D-93E3-D07F7EBDDEA8}" type="slidenum">
+              <a:rPr lang="en-US" smtClean="0"/>
+              <a:t>15</a:t>
+            </a:fld>
+            <a:endParaRPr lang="en-US"/>
+          </a:p>
+        </p:txBody>
+      </p:sp>
+    </p:spTree>
+    <p:extLst>
+      <p:ext uri="{BB962C8B-B14F-4D97-AF65-F5344CB8AC3E}">
+        <p14:creationId xmlns:p14="http://schemas.microsoft.com/office/powerpoint/2010/main" val="1395270687"/>
+      </p:ext>
+    </p:extLst>
+  </p:cSld>
+  <p:clrMapOvr>
+    <a:masterClrMapping/>
+  </p:clrMapOvr>
+</p:notes>
+</file>
+
+<file path=ppt/notesSlides/notesSlide12.xml><?xml version="1.0" encoding="utf-8"?>
+<p:notes xmlns:a="http://schemas.openxmlformats.org/drawingml/2006/main" xmlns:r="http://schemas.openxmlformats.org/officeDocument/2006/relationships" xmlns:p="http://schemas.openxmlformats.org/presentationml/2006/main">
+  <p:cSld>
+    <p:spTree>
+      <p:nvGrpSpPr>
+        <p:cNvPr id="1" name=""/>
+        <p:cNvGrpSpPr/>
+        <p:nvPr/>
+      </p:nvGrpSpPr>
+      <p:grpSpPr>
+        <a:xfrm>
+          <a:off x="0" y="0"/>
+          <a:ext cx="0" cy="0"/>
+          <a:chOff x="0" y="0"/>
+          <a:chExt cx="0" cy="0"/>
+        </a:xfrm>
+      </p:grpSpPr>
+      <p:sp>
+        <p:nvSpPr>
+          <p:cNvPr id="2" name="Slide Image Placeholder 1"/>
+          <p:cNvSpPr>
+            <a:spLocks noGrp="1" noRot="1" noChangeAspect="1"/>
+          </p:cNvSpPr>
+          <p:nvPr>
+            <p:ph type="sldImg"/>
+          </p:nvPr>
+        </p:nvSpPr>
+        <p:spPr/>
+      </p:sp>
+      <p:sp>
+        <p:nvSpPr>
+          <p:cNvPr id="3" name="Notes Placeholder 2"/>
+          <p:cNvSpPr>
+            <a:spLocks noGrp="1"/>
+          </p:cNvSpPr>
+          <p:nvPr>
+            <p:ph type="body" idx="1"/>
+          </p:nvPr>
+        </p:nvSpPr>
+        <p:spPr/>
+        <p:txBody>
+          <a:bodyPr/>
+          <a:lstStyle/>
+          <a:p>
+            <a:pPr marL="0" marR="0" lvl="0" indent="0" algn="l" defTabSz="457200" rtl="0" eaLnBrk="1" fontAlgn="auto" latinLnBrk="0" hangingPunct="1">
+              <a:lnSpc>
+                <a:spcPct val="100000"/>
+              </a:lnSpc>
+              <a:spcBef>
+                <a:spcPts val="0"/>
+              </a:spcBef>
+              <a:spcAft>
+                <a:spcPts val="0"/>
+              </a:spcAft>
+              <a:buClrTx/>
+              <a:buSzTx/>
+              <a:buFontTx/>
+              <a:buNone/>
+              <a:tabLst/>
+              <a:defRPr/>
+            </a:pPr>
+            <a:r>
+              <a:rPr lang="en-US" sz="1200" dirty="0">
+                <a:hlinkClick r:id="rId3"/>
+              </a:rPr>
+              <a:t>http://api.wunderground.com/weather/api/d/docs</a:t>
+            </a:r>
+            <a:r>
+              <a:rPr lang="en-US" sz="1200" dirty="0"/>
+              <a:t> </a:t>
+            </a:r>
+          </a:p>
+          <a:p>
+            <a:endParaRPr lang="en-US" dirty="0"/>
+          </a:p>
+        </p:txBody>
+      </p:sp>
+      <p:sp>
+        <p:nvSpPr>
+          <p:cNvPr id="4" name="Slide Number Placeholder 3"/>
+          <p:cNvSpPr>
+            <a:spLocks noGrp="1"/>
+          </p:cNvSpPr>
+          <p:nvPr>
+            <p:ph type="sldNum" sz="quarter" idx="10"/>
+          </p:nvPr>
+        </p:nvSpPr>
+        <p:spPr/>
+        <p:txBody>
+          <a:bodyPr/>
+          <a:lstStyle/>
+          <a:p>
+            <a:fld id="{44EB6C7D-DFD8-944D-93E3-D07F7EBDDEA8}" type="slidenum">
+              <a:rPr lang="en-US" smtClean="0"/>
+              <a:t>16</a:t>
+            </a:fld>
+            <a:endParaRPr lang="en-US"/>
+          </a:p>
+        </p:txBody>
+      </p:sp>
+    </p:spTree>
+    <p:extLst>
+      <p:ext uri="{BB962C8B-B14F-4D97-AF65-F5344CB8AC3E}">
+        <p14:creationId xmlns:p14="http://schemas.microsoft.com/office/powerpoint/2010/main" val="2585597161"/>
       </p:ext>
     </p:extLst>
   </p:cSld>
@@ -5024,6 +5337,697 @@
 </file>
 
 <file path=ppt/slides/slide14.xml><?xml version="1.0" encoding="utf-8"?>
+<p:sld xmlns:a="http://schemas.openxmlformats.org/drawingml/2006/main" xmlns:r="http://schemas.openxmlformats.org/officeDocument/2006/relationships" xmlns:p="http://schemas.openxmlformats.org/presentationml/2006/main">
+  <p:cSld>
+    <p:bg>
+      <p:bgPr>
+        <a:gradFill flip="none" rotWithShape="1">
+          <a:gsLst>
+            <a:gs pos="100000">
+              <a:schemeClr val="bg2">
+                <a:lumMod val="25000"/>
+                <a:alpha val="68000"/>
+              </a:schemeClr>
+            </a:gs>
+            <a:gs pos="55000">
+              <a:schemeClr val="bg2">
+                <a:lumMod val="50000"/>
+                <a:alpha val="30000"/>
+              </a:schemeClr>
+            </a:gs>
+          </a:gsLst>
+          <a:lin ang="5400000" scaled="0"/>
+          <a:tileRect/>
+        </a:gradFill>
+        <a:effectLst/>
+      </p:bgPr>
+    </p:bg>
+    <p:spTree>
+      <p:nvGrpSpPr>
+        <p:cNvPr id="1" name=""/>
+        <p:cNvGrpSpPr/>
+        <p:nvPr/>
+      </p:nvGrpSpPr>
+      <p:grpSpPr>
+        <a:xfrm>
+          <a:off x="0" y="0"/>
+          <a:ext cx="0" cy="0"/>
+          <a:chOff x="0" y="0"/>
+          <a:chExt cx="0" cy="0"/>
+        </a:xfrm>
+      </p:grpSpPr>
+      <p:sp>
+        <p:nvSpPr>
+          <p:cNvPr id="3" name="Content Placeholder 2"/>
+          <p:cNvSpPr>
+            <a:spLocks noGrp="1"/>
+          </p:cNvSpPr>
+          <p:nvPr>
+            <p:ph idx="1"/>
+          </p:nvPr>
+        </p:nvSpPr>
+        <p:spPr>
+          <a:xfrm>
+            <a:off x="899410" y="1603948"/>
+            <a:ext cx="7345180" cy="4522215"/>
+          </a:xfrm>
+        </p:spPr>
+        <p:txBody>
+          <a:bodyPr>
+            <a:normAutofit/>
+          </a:bodyPr>
+          <a:lstStyle/>
+          <a:p>
+            <a:pPr marL="0" indent="0">
+              <a:buNone/>
+            </a:pPr>
+            <a:r>
+              <a:rPr lang="en-US" b="1" dirty="0"/>
+              <a:t>Use the </a:t>
+            </a:r>
+            <a:r>
+              <a:rPr lang="en-US" b="1" dirty="0" err="1"/>
+              <a:t>Java.io</a:t>
+            </a:r>
+            <a:r>
+              <a:rPr lang="en-US" b="1" dirty="0"/>
+              <a:t> packages</a:t>
+            </a:r>
+          </a:p>
+          <a:p>
+            <a:pPr marL="0" indent="0">
+              <a:buNone/>
+            </a:pPr>
+            <a:endParaRPr lang="en-US" sz="2400" dirty="0"/>
+          </a:p>
+          <a:p>
+            <a:pPr marL="0" indent="0">
+              <a:buNone/>
+            </a:pPr>
+            <a:r>
+              <a:rPr lang="en-US" sz="2400" dirty="0"/>
+              <a:t>import </a:t>
+            </a:r>
+            <a:r>
+              <a:rPr lang="en-US" sz="2400" dirty="0" err="1"/>
+              <a:t>java.io.InputStream</a:t>
+            </a:r>
+            <a:r>
+              <a:rPr lang="en-US" sz="2400" dirty="0"/>
+              <a:t>;</a:t>
+            </a:r>
+          </a:p>
+          <a:p>
+            <a:pPr marL="0" indent="0">
+              <a:buNone/>
+            </a:pPr>
+            <a:r>
+              <a:rPr lang="en-US" sz="2400" dirty="0"/>
+              <a:t>import </a:t>
+            </a:r>
+            <a:r>
+              <a:rPr lang="en-US" sz="2400" dirty="0" err="1"/>
+              <a:t>java.net.HttpURLConnection</a:t>
+            </a:r>
+            <a:r>
+              <a:rPr lang="en-US" sz="2400" dirty="0"/>
+              <a:t>;</a:t>
+            </a:r>
+          </a:p>
+          <a:p>
+            <a:pPr marL="0" indent="0">
+              <a:buNone/>
+            </a:pPr>
+            <a:r>
+              <a:rPr lang="en-US" sz="2400" dirty="0"/>
+              <a:t>import </a:t>
+            </a:r>
+            <a:r>
+              <a:rPr lang="en-US" sz="2400" dirty="0" err="1"/>
+              <a:t>java.net.URL</a:t>
+            </a:r>
+            <a:r>
+              <a:rPr lang="en-US" sz="2400" dirty="0"/>
+              <a:t>;</a:t>
+            </a:r>
+          </a:p>
+          <a:p>
+            <a:pPr marL="0" indent="0">
+              <a:buNone/>
+            </a:pPr>
+            <a:endParaRPr lang="en-US" sz="2400" dirty="0"/>
+          </a:p>
+          <a:p>
+            <a:pPr marL="0" indent="0">
+              <a:buNone/>
+            </a:pPr>
+            <a:r>
+              <a:rPr lang="en-US" sz="2400" dirty="0" err="1"/>
+              <a:t>Java.io</a:t>
+            </a:r>
+            <a:r>
+              <a:rPr lang="en-US" sz="2400" dirty="0"/>
+              <a:t> is one part of the standard Java library</a:t>
+            </a:r>
+          </a:p>
+          <a:p>
+            <a:pPr marL="0" indent="0">
+              <a:buNone/>
+            </a:pPr>
+            <a:r>
+              <a:rPr lang="en-US" sz="2400" dirty="0">
+                <a:hlinkClick r:id="rId3"/>
+              </a:rPr>
+              <a:t>https://docs.oracle.com/javase/8/docs/api/java/io/package-summary.html</a:t>
+            </a:r>
+            <a:r>
+              <a:rPr lang="en-US" sz="2400" dirty="0"/>
+              <a:t> </a:t>
+            </a:r>
+          </a:p>
+        </p:txBody>
+      </p:sp>
+      <p:sp>
+        <p:nvSpPr>
+          <p:cNvPr id="4" name="Title 3"/>
+          <p:cNvSpPr>
+            <a:spLocks noGrp="1"/>
+          </p:cNvSpPr>
+          <p:nvPr>
+            <p:ph type="title"/>
+          </p:nvPr>
+        </p:nvSpPr>
+        <p:spPr/>
+        <p:txBody>
+          <a:bodyPr>
+            <a:normAutofit/>
+          </a:bodyPr>
+          <a:lstStyle/>
+          <a:p>
+            <a:r>
+              <a:rPr lang="en-US" b="1" dirty="0">
+                <a:solidFill>
+                  <a:srgbClr val="0000FF"/>
+                </a:solidFill>
+              </a:rPr>
+              <a:t>Java REST Client Code</a:t>
+            </a:r>
+          </a:p>
+        </p:txBody>
+      </p:sp>
+    </p:spTree>
+    <p:extLst>
+      <p:ext uri="{BB962C8B-B14F-4D97-AF65-F5344CB8AC3E}">
+        <p14:creationId xmlns:p14="http://schemas.microsoft.com/office/powerpoint/2010/main" val="1812659054"/>
+      </p:ext>
+    </p:extLst>
+  </p:cSld>
+  <p:clrMapOvr>
+    <a:masterClrMapping/>
+  </p:clrMapOvr>
+</p:sld>
+</file>
+
+<file path=ppt/slides/slide15.xml><?xml version="1.0" encoding="utf-8"?>
+<p:sld xmlns:a="http://schemas.openxmlformats.org/drawingml/2006/main" xmlns:r="http://schemas.openxmlformats.org/officeDocument/2006/relationships" xmlns:p="http://schemas.openxmlformats.org/presentationml/2006/main">
+  <p:cSld>
+    <p:bg>
+      <p:bgPr>
+        <a:gradFill flip="none" rotWithShape="1">
+          <a:gsLst>
+            <a:gs pos="100000">
+              <a:schemeClr val="bg2">
+                <a:lumMod val="25000"/>
+                <a:alpha val="68000"/>
+              </a:schemeClr>
+            </a:gs>
+            <a:gs pos="55000">
+              <a:schemeClr val="bg2">
+                <a:lumMod val="50000"/>
+                <a:alpha val="30000"/>
+              </a:schemeClr>
+            </a:gs>
+          </a:gsLst>
+          <a:lin ang="5400000" scaled="0"/>
+          <a:tileRect/>
+        </a:gradFill>
+        <a:effectLst/>
+      </p:bgPr>
+    </p:bg>
+    <p:spTree>
+      <p:nvGrpSpPr>
+        <p:cNvPr id="1" name=""/>
+        <p:cNvGrpSpPr/>
+        <p:nvPr/>
+      </p:nvGrpSpPr>
+      <p:grpSpPr>
+        <a:xfrm>
+          <a:off x="0" y="0"/>
+          <a:ext cx="0" cy="0"/>
+          <a:chOff x="0" y="0"/>
+          <a:chExt cx="0" cy="0"/>
+        </a:xfrm>
+      </p:grpSpPr>
+      <p:sp>
+        <p:nvSpPr>
+          <p:cNvPr id="3" name="Content Placeholder 2"/>
+          <p:cNvSpPr>
+            <a:spLocks noGrp="1"/>
+          </p:cNvSpPr>
+          <p:nvPr>
+            <p:ph idx="1"/>
+          </p:nvPr>
+        </p:nvSpPr>
+        <p:spPr>
+          <a:xfrm>
+            <a:off x="899410" y="1603948"/>
+            <a:ext cx="7345180" cy="4522215"/>
+          </a:xfrm>
+        </p:spPr>
+        <p:txBody>
+          <a:bodyPr>
+            <a:normAutofit/>
+          </a:bodyPr>
+          <a:lstStyle/>
+          <a:p>
+            <a:pPr marL="0" indent="0">
+              <a:buNone/>
+            </a:pPr>
+            <a:r>
+              <a:rPr lang="en-US" sz="2800" b="1" dirty="0"/>
+              <a:t>Build the string used for the REST query:</a:t>
+            </a:r>
+          </a:p>
+          <a:p>
+            <a:pPr marL="0" indent="0">
+              <a:buNone/>
+            </a:pPr>
+            <a:endParaRPr lang="en-US" sz="1800" b="1" dirty="0"/>
+          </a:p>
+          <a:p>
+            <a:pPr marL="0" indent="0">
+              <a:buNone/>
+            </a:pPr>
+            <a:r>
+              <a:rPr lang="en-US" sz="2400" dirty="0"/>
+              <a:t>String </a:t>
+            </a:r>
+            <a:r>
+              <a:rPr lang="en-US" sz="2400" dirty="0" err="1"/>
+              <a:t>apiKey</a:t>
+            </a:r>
+            <a:r>
+              <a:rPr lang="en-US" sz="2400" dirty="0"/>
+              <a:t> = "0e3e69302fba4e56"; </a:t>
+            </a:r>
+          </a:p>
+          <a:p>
+            <a:pPr marL="0" indent="0">
+              <a:buNone/>
+            </a:pPr>
+            <a:r>
+              <a:rPr lang="en-US" sz="2400" dirty="0"/>
+              <a:t>String </a:t>
+            </a:r>
+            <a:r>
+              <a:rPr lang="en-US" sz="2400" dirty="0" err="1"/>
+              <a:t>baseUrl</a:t>
+            </a:r>
+            <a:r>
+              <a:rPr lang="en-US" sz="2400" dirty="0"/>
+              <a:t> = "http://</a:t>
+            </a:r>
+            <a:r>
+              <a:rPr lang="en-US" sz="2400" dirty="0" err="1"/>
+              <a:t>api.wunderground.com</a:t>
+            </a:r>
+            <a:r>
+              <a:rPr lang="en-US" sz="2400" dirty="0"/>
+              <a:t>/</a:t>
+            </a:r>
+            <a:r>
+              <a:rPr lang="en-US" sz="2400" dirty="0" err="1"/>
+              <a:t>api</a:t>
+            </a:r>
+            <a:r>
+              <a:rPr lang="en-US" sz="2400" dirty="0"/>
+              <a:t>/";</a:t>
+            </a:r>
+          </a:p>
+          <a:p>
+            <a:pPr marL="0" indent="0">
+              <a:buNone/>
+            </a:pPr>
+            <a:r>
+              <a:rPr lang="en-US" sz="2400" dirty="0"/>
+              <a:t>String query = "/forecast/q/OR/</a:t>
+            </a:r>
+            <a:r>
+              <a:rPr lang="en-US" sz="2400" dirty="0" err="1"/>
+              <a:t>Eugene.xml</a:t>
+            </a:r>
+            <a:r>
+              <a:rPr lang="en-US" sz="2400" dirty="0"/>
+              <a:t>";</a:t>
+            </a:r>
+          </a:p>
+          <a:p>
+            <a:pPr marL="0" indent="0">
+              <a:buNone/>
+            </a:pPr>
+            <a:endParaRPr lang="en-US" sz="2400" dirty="0"/>
+          </a:p>
+          <a:p>
+            <a:pPr marL="0" indent="0">
+              <a:buNone/>
+            </a:pPr>
+            <a:r>
+              <a:rPr lang="en-US" sz="2800" b="1" dirty="0"/>
+              <a:t>Create a URL object:</a:t>
+            </a:r>
+          </a:p>
+          <a:p>
+            <a:pPr marL="0" indent="0">
+              <a:buNone/>
+            </a:pPr>
+            <a:r>
+              <a:rPr lang="en-US" sz="2400" dirty="0"/>
+              <a:t>URL </a:t>
+            </a:r>
+            <a:r>
+              <a:rPr lang="en-US" sz="2400" dirty="0" err="1"/>
+              <a:t>url</a:t>
+            </a:r>
+            <a:r>
+              <a:rPr lang="en-US" sz="2400" dirty="0"/>
+              <a:t> = new URL(</a:t>
+            </a:r>
+            <a:r>
+              <a:rPr lang="en-US" sz="2400" dirty="0" err="1"/>
+              <a:t>baseUrl</a:t>
+            </a:r>
+            <a:r>
+              <a:rPr lang="en-US" sz="2400" dirty="0"/>
+              <a:t> + </a:t>
+            </a:r>
+            <a:r>
+              <a:rPr lang="en-US" sz="2400" dirty="0" err="1"/>
+              <a:t>apiKey</a:t>
+            </a:r>
+            <a:r>
+              <a:rPr lang="en-US" sz="2400" dirty="0"/>
+              <a:t> + query);</a:t>
+            </a:r>
+          </a:p>
+          <a:p>
+            <a:pPr marL="0" indent="0">
+              <a:buNone/>
+            </a:pPr>
+            <a:endParaRPr lang="en-US" sz="2400" dirty="0"/>
+          </a:p>
+        </p:txBody>
+      </p:sp>
+      <p:sp>
+        <p:nvSpPr>
+          <p:cNvPr id="4" name="Title 3"/>
+          <p:cNvSpPr>
+            <a:spLocks noGrp="1"/>
+          </p:cNvSpPr>
+          <p:nvPr>
+            <p:ph type="title"/>
+          </p:nvPr>
+        </p:nvSpPr>
+        <p:spPr/>
+        <p:txBody>
+          <a:bodyPr>
+            <a:normAutofit/>
+          </a:bodyPr>
+          <a:lstStyle/>
+          <a:p>
+            <a:r>
+              <a:rPr lang="en-US" b="1" dirty="0">
+                <a:solidFill>
+                  <a:srgbClr val="0000FF"/>
+                </a:solidFill>
+              </a:rPr>
+              <a:t>Set up a URL</a:t>
+            </a:r>
+          </a:p>
+        </p:txBody>
+      </p:sp>
+    </p:spTree>
+    <p:extLst>
+      <p:ext uri="{BB962C8B-B14F-4D97-AF65-F5344CB8AC3E}">
+        <p14:creationId xmlns:p14="http://schemas.microsoft.com/office/powerpoint/2010/main" val="2379532458"/>
+      </p:ext>
+    </p:extLst>
+  </p:cSld>
+  <p:clrMapOvr>
+    <a:masterClrMapping/>
+  </p:clrMapOvr>
+</p:sld>
+</file>
+
+<file path=ppt/slides/slide16.xml><?xml version="1.0" encoding="utf-8"?>
+<p:sld xmlns:a="http://schemas.openxmlformats.org/drawingml/2006/main" xmlns:r="http://schemas.openxmlformats.org/officeDocument/2006/relationships" xmlns:p="http://schemas.openxmlformats.org/presentationml/2006/main">
+  <p:cSld>
+    <p:bg>
+      <p:bgPr>
+        <a:gradFill flip="none" rotWithShape="1">
+          <a:gsLst>
+            <a:gs pos="100000">
+              <a:schemeClr val="bg2">
+                <a:lumMod val="25000"/>
+                <a:alpha val="68000"/>
+              </a:schemeClr>
+            </a:gs>
+            <a:gs pos="55000">
+              <a:schemeClr val="bg2">
+                <a:lumMod val="50000"/>
+                <a:alpha val="30000"/>
+              </a:schemeClr>
+            </a:gs>
+          </a:gsLst>
+          <a:lin ang="5400000" scaled="0"/>
+          <a:tileRect/>
+        </a:gradFill>
+        <a:effectLst/>
+      </p:bgPr>
+    </p:bg>
+    <p:spTree>
+      <p:nvGrpSpPr>
+        <p:cNvPr id="1" name=""/>
+        <p:cNvGrpSpPr/>
+        <p:nvPr/>
+      </p:nvGrpSpPr>
+      <p:grpSpPr>
+        <a:xfrm>
+          <a:off x="0" y="0"/>
+          <a:ext cx="0" cy="0"/>
+          <a:chOff x="0" y="0"/>
+          <a:chExt cx="0" cy="0"/>
+        </a:xfrm>
+      </p:grpSpPr>
+      <p:sp>
+        <p:nvSpPr>
+          <p:cNvPr id="3" name="Content Placeholder 2"/>
+          <p:cNvSpPr>
+            <a:spLocks noGrp="1"/>
+          </p:cNvSpPr>
+          <p:nvPr>
+            <p:ph idx="1"/>
+          </p:nvPr>
+        </p:nvSpPr>
+        <p:spPr>
+          <a:xfrm>
+            <a:off x="899410" y="1603948"/>
+            <a:ext cx="7345180" cy="4522215"/>
+          </a:xfrm>
+        </p:spPr>
+        <p:txBody>
+          <a:bodyPr>
+            <a:normAutofit lnSpcReduction="10000"/>
+          </a:bodyPr>
+          <a:lstStyle/>
+          <a:p>
+            <a:pPr marL="0" indent="0">
+              <a:buNone/>
+            </a:pPr>
+            <a:r>
+              <a:rPr lang="en-US" sz="2400" dirty="0" err="1"/>
+              <a:t>HttpURLConnection</a:t>
+            </a:r>
+            <a:r>
+              <a:rPr lang="en-US" sz="2400" dirty="0"/>
+              <a:t> connection = </a:t>
+            </a:r>
+            <a:br>
+              <a:rPr lang="en-US" sz="2400" dirty="0"/>
+            </a:br>
+            <a:r>
+              <a:rPr lang="en-US" sz="2400" dirty="0"/>
+              <a:t>         (</a:t>
+            </a:r>
+            <a:r>
+              <a:rPr lang="en-US" sz="2400" dirty="0" err="1"/>
+              <a:t>HttpURLConnection</a:t>
+            </a:r>
+            <a:r>
+              <a:rPr lang="en-US" sz="2400" dirty="0"/>
+              <a:t>)</a:t>
+            </a:r>
+            <a:r>
+              <a:rPr lang="en-US" sz="2400" dirty="0" err="1"/>
+              <a:t>url.openConnection</a:t>
+            </a:r>
+            <a:r>
+              <a:rPr lang="en-US" sz="2400" dirty="0"/>
+              <a:t>();</a:t>
+            </a:r>
+          </a:p>
+          <a:p>
+            <a:pPr marL="0" indent="0">
+              <a:buNone/>
+            </a:pPr>
+            <a:endParaRPr lang="en-US" sz="2400" dirty="0"/>
+          </a:p>
+          <a:p>
+            <a:pPr marL="0" indent="0">
+              <a:buNone/>
+            </a:pPr>
+            <a:r>
+              <a:rPr lang="en-US" sz="2400" dirty="0" err="1"/>
+              <a:t>connection.setRequestProperty</a:t>
+            </a:r>
+            <a:r>
+              <a:rPr lang="en-US" sz="2400" dirty="0"/>
+              <a:t>("User-Agent", </a:t>
+            </a:r>
+            <a:br>
+              <a:rPr lang="en-US" sz="2400" dirty="0"/>
+            </a:br>
+            <a:r>
+              <a:rPr lang="en-US" sz="2400" dirty="0"/>
+              <a:t>   "</a:t>
+            </a:r>
+            <a:r>
+              <a:rPr lang="en-US" sz="2400" dirty="0" err="1"/>
+              <a:t>weatherdemo</a:t>
+            </a:r>
+            <a:r>
+              <a:rPr lang="en-US" sz="2400" dirty="0"/>
+              <a:t>-app");   // key-value pair identifying us</a:t>
+            </a:r>
+          </a:p>
+          <a:p>
+            <a:pPr marL="0" indent="0">
+              <a:buNone/>
+            </a:pPr>
+            <a:endParaRPr lang="en-US" sz="2400" dirty="0"/>
+          </a:p>
+          <a:p>
+            <a:pPr marL="0" indent="0">
+              <a:buNone/>
+            </a:pPr>
+            <a:r>
+              <a:rPr lang="en-US" sz="2400" dirty="0" err="1"/>
+              <a:t>connection.setRequestMethod</a:t>
+            </a:r>
+            <a:r>
+              <a:rPr lang="en-US" sz="2400" dirty="0"/>
+              <a:t>("GET"); </a:t>
+            </a:r>
+          </a:p>
+          <a:p>
+            <a:pPr marL="0" indent="0">
+              <a:buNone/>
+            </a:pPr>
+            <a:endParaRPr lang="en-US" sz="2400" dirty="0"/>
+          </a:p>
+          <a:p>
+            <a:pPr marL="0" indent="0">
+              <a:buNone/>
+            </a:pPr>
+            <a:r>
+              <a:rPr lang="en-US" sz="2400" dirty="0" err="1"/>
+              <a:t>connection.connect</a:t>
+            </a:r>
+            <a:r>
+              <a:rPr lang="en-US" sz="2400" dirty="0"/>
+              <a:t>();</a:t>
+            </a:r>
+          </a:p>
+          <a:p>
+            <a:pPr marL="0" indent="0">
+              <a:buNone/>
+            </a:pPr>
+            <a:endParaRPr lang="en-US" sz="2400" dirty="0"/>
+          </a:p>
+          <a:p>
+            <a:pPr marL="0" indent="0">
+              <a:buNone/>
+            </a:pPr>
+            <a:r>
+              <a:rPr lang="en-US" sz="2400" dirty="0" err="1"/>
+              <a:t>InputStream</a:t>
+            </a:r>
+            <a:r>
+              <a:rPr lang="en-US" sz="2400" dirty="0"/>
+              <a:t> in = </a:t>
+            </a:r>
+            <a:r>
+              <a:rPr lang="en-US" sz="2400" dirty="0" err="1"/>
+              <a:t>connection.getInputStream</a:t>
+            </a:r>
+            <a:r>
+              <a:rPr lang="en-US" sz="2400" dirty="0"/>
+              <a:t>();</a:t>
+            </a:r>
+          </a:p>
+        </p:txBody>
+      </p:sp>
+      <p:sp>
+        <p:nvSpPr>
+          <p:cNvPr id="4" name="Title 3"/>
+          <p:cNvSpPr>
+            <a:spLocks noGrp="1"/>
+          </p:cNvSpPr>
+          <p:nvPr>
+            <p:ph type="title"/>
+          </p:nvPr>
+        </p:nvSpPr>
+        <p:spPr/>
+        <p:txBody>
+          <a:bodyPr>
+            <a:normAutofit/>
+          </a:bodyPr>
+          <a:lstStyle/>
+          <a:p>
+            <a:r>
+              <a:rPr lang="en-US" b="1" dirty="0">
+                <a:solidFill>
+                  <a:srgbClr val="0000FF"/>
+                </a:solidFill>
+              </a:rPr>
+              <a:t>Request and Receive a Response</a:t>
+            </a:r>
+          </a:p>
+        </p:txBody>
+      </p:sp>
+    </p:spTree>
+    <p:extLst>
+      <p:ext uri="{BB962C8B-B14F-4D97-AF65-F5344CB8AC3E}">
+        <p14:creationId xmlns:p14="http://schemas.microsoft.com/office/powerpoint/2010/main" val="3913445767"/>
+      </p:ext>
+    </p:extLst>
+  </p:cSld>
+  <p:clrMapOvr>
+    <a:masterClrMapping/>
+  </p:clrMapOvr>
+</p:sld>
+</file>
+
+<file path=ppt/slides/slide17.xml><?xml version="1.0" encoding="utf-8"?>
 <p:sld xmlns:a="http://schemas.openxmlformats.org/drawingml/2006/main" xmlns:r="http://schemas.openxmlformats.org/officeDocument/2006/relationships" xmlns:p="http://schemas.openxmlformats.org/presentationml/2006/main">
   <p:cSld>
     <p:bg>

</xml_diff>

<commit_message>
Changed font for code example
</commit_message>
<xml_diff>
--- a/NotesAndSlides/CIS399Wk4Day1-WebServices+REST.pptx
+++ b/NotesAndSlides/CIS399Wk4Day1-WebServices+REST.pptx
@@ -5403,7 +5403,7 @@
             </a:pPr>
             <a:r>
               <a:rPr lang="en-US" b="1" dirty="0"/>
-              <a:t>Use the </a:t>
+              <a:t>Import the </a:t>
             </a:r>
             <a:r>
               <a:rPr lang="en-US" b="1" dirty="0" err="1"/>
@@ -5425,15 +5425,21 @@
               <a:buNone/>
             </a:pPr>
             <a:r>
-              <a:rPr lang="en-US" sz="2400" dirty="0"/>
+              <a:rPr lang="en-US" sz="2400" dirty="0">
+                <a:latin typeface="Courier" pitchFamily="2" charset="0"/>
+              </a:rPr>
               <a:t>import </a:t>
             </a:r>
             <a:r>
-              <a:rPr lang="en-US" sz="2400" dirty="0" err="1"/>
+              <a:rPr lang="en-US" sz="2400" dirty="0" err="1">
+                <a:latin typeface="Courier" pitchFamily="2" charset="0"/>
+              </a:rPr>
               <a:t>java.io.InputStream</a:t>
             </a:r>
             <a:r>
-              <a:rPr lang="en-US" sz="2400" dirty="0"/>
+              <a:rPr lang="en-US" sz="2400" dirty="0">
+                <a:latin typeface="Courier" pitchFamily="2" charset="0"/>
+              </a:rPr>
               <a:t>;</a:t>
             </a:r>
           </a:p>
@@ -5442,15 +5448,21 @@
               <a:buNone/>
             </a:pPr>
             <a:r>
-              <a:rPr lang="en-US" sz="2400" dirty="0"/>
+              <a:rPr lang="en-US" sz="2400" dirty="0">
+                <a:latin typeface="Courier" pitchFamily="2" charset="0"/>
+              </a:rPr>
               <a:t>import </a:t>
             </a:r>
             <a:r>
-              <a:rPr lang="en-US" sz="2400" dirty="0" err="1"/>
+              <a:rPr lang="en-US" sz="2400" dirty="0" err="1">
+                <a:latin typeface="Courier" pitchFamily="2" charset="0"/>
+              </a:rPr>
               <a:t>java.net.HttpURLConnection</a:t>
             </a:r>
             <a:r>
-              <a:rPr lang="en-US" sz="2400" dirty="0"/>
+              <a:rPr lang="en-US" sz="2400" dirty="0">
+                <a:latin typeface="Courier" pitchFamily="2" charset="0"/>
+              </a:rPr>
               <a:t>;</a:t>
             </a:r>
           </a:p>
@@ -5459,15 +5471,21 @@
               <a:buNone/>
             </a:pPr>
             <a:r>
-              <a:rPr lang="en-US" sz="2400" dirty="0"/>
+              <a:rPr lang="en-US" sz="2400" dirty="0">
+                <a:latin typeface="Courier" pitchFamily="2" charset="0"/>
+              </a:rPr>
               <a:t>import </a:t>
             </a:r>
             <a:r>
-              <a:rPr lang="en-US" sz="2400" dirty="0" err="1"/>
+              <a:rPr lang="en-US" sz="2400" dirty="0" err="1">
+                <a:latin typeface="Courier" pitchFamily="2" charset="0"/>
+              </a:rPr>
               <a:t>java.net.URL</a:t>
             </a:r>
             <a:r>
-              <a:rPr lang="en-US" sz="2400" dirty="0"/>
+              <a:rPr lang="en-US" sz="2400" dirty="0">
+                <a:latin typeface="Courier" pitchFamily="2" charset="0"/>
+              </a:rPr>
               <a:t>;</a:t>
             </a:r>
           </a:p>
@@ -5600,13 +5618,13 @@
         </p:nvSpPr>
         <p:spPr>
           <a:xfrm>
-            <a:off x="899410" y="1603948"/>
-            <a:ext cx="7345180" cy="4522215"/>
+            <a:off x="584617" y="1603948"/>
+            <a:ext cx="7914806" cy="4522215"/>
           </a:xfrm>
         </p:spPr>
         <p:txBody>
           <a:bodyPr>
-            <a:normAutofit/>
+            <a:normAutofit lnSpcReduction="10000"/>
           </a:bodyPr>
           <a:lstStyle/>
           <a:p>
@@ -5629,15 +5647,21 @@
               <a:buNone/>
             </a:pPr>
             <a:r>
-              <a:rPr lang="en-US" sz="2400" dirty="0"/>
+              <a:rPr lang="en-US" sz="2400" dirty="0">
+                <a:latin typeface="Courier" pitchFamily="2" charset="0"/>
+              </a:rPr>
               <a:t>String </a:t>
             </a:r>
             <a:r>
-              <a:rPr lang="en-US" sz="2400" dirty="0" err="1"/>
+              <a:rPr lang="en-US" sz="2400" dirty="0" err="1">
+                <a:latin typeface="Courier" pitchFamily="2" charset="0"/>
+              </a:rPr>
               <a:t>apiKey</a:t>
             </a:r>
             <a:r>
-              <a:rPr lang="en-US" sz="2400" dirty="0"/>
+              <a:rPr lang="en-US" sz="2400" dirty="0">
+                <a:latin typeface="Courier" pitchFamily="2" charset="0"/>
+              </a:rPr>
               <a:t> = "0e3e69302fba4e56"; </a:t>
             </a:r>
           </a:p>
@@ -5646,31 +5670,45 @@
               <a:buNone/>
             </a:pPr>
             <a:r>
-              <a:rPr lang="en-US" sz="2400" dirty="0"/>
+              <a:rPr lang="en-US" sz="2400" dirty="0">
+                <a:latin typeface="Courier" pitchFamily="2" charset="0"/>
+              </a:rPr>
               <a:t>String </a:t>
             </a:r>
             <a:r>
-              <a:rPr lang="en-US" sz="2400" dirty="0" err="1"/>
+              <a:rPr lang="en-US" sz="2400" dirty="0" err="1">
+                <a:latin typeface="Courier" pitchFamily="2" charset="0"/>
+              </a:rPr>
               <a:t>baseUrl</a:t>
             </a:r>
             <a:r>
-              <a:rPr lang="en-US" sz="2400" dirty="0"/>
+              <a:rPr lang="en-US" sz="2400" dirty="0">
+                <a:latin typeface="Courier" pitchFamily="2" charset="0"/>
+              </a:rPr>
               <a:t> = "http://</a:t>
             </a:r>
             <a:r>
-              <a:rPr lang="en-US" sz="2400" dirty="0" err="1"/>
+              <a:rPr lang="en-US" sz="2400" dirty="0" err="1">
+                <a:latin typeface="Courier" pitchFamily="2" charset="0"/>
+              </a:rPr>
               <a:t>api.wunderground.com</a:t>
             </a:r>
             <a:r>
-              <a:rPr lang="en-US" sz="2400" dirty="0"/>
+              <a:rPr lang="en-US" sz="2400" dirty="0">
+                <a:latin typeface="Courier" pitchFamily="2" charset="0"/>
+              </a:rPr>
               <a:t>/</a:t>
             </a:r>
             <a:r>
-              <a:rPr lang="en-US" sz="2400" dirty="0" err="1"/>
+              <a:rPr lang="en-US" sz="2400" dirty="0" err="1">
+                <a:latin typeface="Courier" pitchFamily="2" charset="0"/>
+              </a:rPr>
               <a:t>api</a:t>
             </a:r>
             <a:r>
-              <a:rPr lang="en-US" sz="2400" dirty="0"/>
+              <a:rPr lang="en-US" sz="2400" dirty="0">
+                <a:latin typeface="Courier" pitchFamily="2" charset="0"/>
+              </a:rPr>
               <a:t>/";</a:t>
             </a:r>
           </a:p>
@@ -5679,15 +5717,21 @@
               <a:buNone/>
             </a:pPr>
             <a:r>
-              <a:rPr lang="en-US" sz="2400" dirty="0"/>
+              <a:rPr lang="en-US" sz="2400" dirty="0">
+                <a:latin typeface="Courier" pitchFamily="2" charset="0"/>
+              </a:rPr>
               <a:t>String query = "/forecast/q/OR/</a:t>
             </a:r>
             <a:r>
-              <a:rPr lang="en-US" sz="2400" dirty="0" err="1"/>
+              <a:rPr lang="en-US" sz="2400" dirty="0" err="1">
+                <a:latin typeface="Courier" pitchFamily="2" charset="0"/>
+              </a:rPr>
               <a:t>Eugene.xml</a:t>
             </a:r>
             <a:r>
-              <a:rPr lang="en-US" sz="2400" dirty="0"/>
+              <a:rPr lang="en-US" sz="2400" dirty="0">
+                <a:latin typeface="Courier" pitchFamily="2" charset="0"/>
+              </a:rPr>
               <a:t>";</a:t>
             </a:r>
           </a:p>
@@ -5711,31 +5755,45 @@
               <a:buNone/>
             </a:pPr>
             <a:r>
-              <a:rPr lang="en-US" sz="2400" dirty="0"/>
+              <a:rPr lang="en-US" sz="2400" dirty="0">
+                <a:latin typeface="Courier" pitchFamily="2" charset="0"/>
+              </a:rPr>
               <a:t>URL </a:t>
             </a:r>
             <a:r>
-              <a:rPr lang="en-US" sz="2400" dirty="0" err="1"/>
+              <a:rPr lang="en-US" sz="2400" dirty="0" err="1">
+                <a:latin typeface="Courier" pitchFamily="2" charset="0"/>
+              </a:rPr>
               <a:t>url</a:t>
             </a:r>
             <a:r>
-              <a:rPr lang="en-US" sz="2400" dirty="0"/>
+              <a:rPr lang="en-US" sz="2400" dirty="0">
+                <a:latin typeface="Courier" pitchFamily="2" charset="0"/>
+              </a:rPr>
               <a:t> = new URL(</a:t>
             </a:r>
             <a:r>
-              <a:rPr lang="en-US" sz="2400" dirty="0" err="1"/>
+              <a:rPr lang="en-US" sz="2400" dirty="0" err="1">
+                <a:latin typeface="Courier" pitchFamily="2" charset="0"/>
+              </a:rPr>
               <a:t>baseUrl</a:t>
             </a:r>
             <a:r>
-              <a:rPr lang="en-US" sz="2400" dirty="0"/>
+              <a:rPr lang="en-US" sz="2400" dirty="0">
+                <a:latin typeface="Courier" pitchFamily="2" charset="0"/>
+              </a:rPr>
               <a:t> + </a:t>
             </a:r>
             <a:r>
-              <a:rPr lang="en-US" sz="2400" dirty="0" err="1"/>
+              <a:rPr lang="en-US" sz="2400" dirty="0" err="1">
+                <a:latin typeface="Courier" pitchFamily="2" charset="0"/>
+              </a:rPr>
               <a:t>apiKey</a:t>
             </a:r>
             <a:r>
-              <a:rPr lang="en-US" sz="2400" dirty="0"/>
+              <a:rPr lang="en-US" sz="2400" dirty="0">
+                <a:latin typeface="Courier" pitchFamily="2" charset="0"/>
+              </a:rPr>
               <a:t> + query);</a:t>
             </a:r>
           </a:p>
@@ -5840,13 +5898,13 @@
         </p:nvSpPr>
         <p:spPr>
           <a:xfrm>
-            <a:off x="899410" y="1603948"/>
-            <a:ext cx="7345180" cy="4522215"/>
+            <a:off x="584616" y="1417638"/>
+            <a:ext cx="8102184" cy="4708525"/>
           </a:xfrm>
         </p:spPr>
         <p:txBody>
           <a:bodyPr>
-            <a:normAutofit lnSpcReduction="10000"/>
+            <a:normAutofit fontScale="92500" lnSpcReduction="10000"/>
           </a:bodyPr>
           <a:lstStyle/>
           <a:p>
@@ -5854,34 +5912,50 @@
               <a:buNone/>
             </a:pPr>
             <a:r>
-              <a:rPr lang="en-US" sz="2400" dirty="0" err="1"/>
+              <a:rPr lang="en-US" sz="2400" dirty="0" err="1">
+                <a:latin typeface="Courier" pitchFamily="2" charset="0"/>
+              </a:rPr>
               <a:t>HttpURLConnection</a:t>
             </a:r>
             <a:r>
-              <a:rPr lang="en-US" sz="2400" dirty="0"/>
+              <a:rPr lang="en-US" sz="2400" dirty="0">
+                <a:latin typeface="Courier" pitchFamily="2" charset="0"/>
+              </a:rPr>
               <a:t> connection = </a:t>
             </a:r>
             <a:br>
-              <a:rPr lang="en-US" sz="2400" dirty="0"/>
+              <a:rPr lang="en-US" sz="2400" dirty="0">
+                <a:latin typeface="Courier" pitchFamily="2" charset="0"/>
+              </a:rPr>
             </a:br>
             <a:r>
-              <a:rPr lang="en-US" sz="2400" dirty="0"/>
+              <a:rPr lang="en-US" sz="2400" dirty="0">
+                <a:latin typeface="Courier" pitchFamily="2" charset="0"/>
+              </a:rPr>
               <a:t>         (</a:t>
             </a:r>
             <a:r>
-              <a:rPr lang="en-US" sz="2400" dirty="0" err="1"/>
+              <a:rPr lang="en-US" sz="2400" dirty="0" err="1">
+                <a:latin typeface="Courier" pitchFamily="2" charset="0"/>
+              </a:rPr>
               <a:t>HttpURLConnection</a:t>
             </a:r>
             <a:r>
-              <a:rPr lang="en-US" sz="2400" dirty="0"/>
+              <a:rPr lang="en-US" sz="2400" dirty="0">
+                <a:latin typeface="Courier" pitchFamily="2" charset="0"/>
+              </a:rPr>
               <a:t>)</a:t>
             </a:r>
             <a:r>
-              <a:rPr lang="en-US" sz="2400" dirty="0" err="1"/>
+              <a:rPr lang="en-US" sz="2400" dirty="0" err="1">
+                <a:latin typeface="Courier" pitchFamily="2" charset="0"/>
+              </a:rPr>
               <a:t>url.openConnection</a:t>
             </a:r>
             <a:r>
-              <a:rPr lang="en-US" sz="2400" dirty="0"/>
+              <a:rPr lang="en-US" sz="2400" dirty="0">
+                <a:latin typeface="Courier" pitchFamily="2" charset="0"/>
+              </a:rPr>
               <a:t>();</a:t>
             </a:r>
           </a:p>
@@ -5889,52 +5963,83 @@
             <a:pPr marL="0" indent="0">
               <a:buNone/>
             </a:pPr>
-            <a:endParaRPr lang="en-US" sz="2400" dirty="0"/>
+            <a:endParaRPr lang="en-US" sz="2400" dirty="0">
+              <a:latin typeface="Courier" pitchFamily="2" charset="0"/>
+            </a:endParaRPr>
           </a:p>
           <a:p>
             <a:pPr marL="0" indent="0">
               <a:buNone/>
             </a:pPr>
             <a:r>
-              <a:rPr lang="en-US" sz="2400" dirty="0" err="1"/>
+              <a:rPr lang="en-US" sz="2400" dirty="0" err="1">
+                <a:latin typeface="Courier" pitchFamily="2" charset="0"/>
+              </a:rPr>
               <a:t>connection.setRequestProperty</a:t>
             </a:r>
             <a:r>
-              <a:rPr lang="en-US" sz="2400" dirty="0"/>
+              <a:rPr lang="en-US" sz="2400" dirty="0">
+                <a:latin typeface="Courier" pitchFamily="2" charset="0"/>
+              </a:rPr>
               <a:t>("User-Agent", </a:t>
             </a:r>
             <a:br>
-              <a:rPr lang="en-US" sz="2400" dirty="0"/>
+              <a:rPr lang="en-US" sz="2400" dirty="0">
+                <a:latin typeface="Courier" pitchFamily="2" charset="0"/>
+              </a:rPr>
             </a:br>
             <a:r>
-              <a:rPr lang="en-US" sz="2400" dirty="0"/>
+              <a:rPr lang="en-US" sz="2400" dirty="0">
+                <a:latin typeface="Courier" pitchFamily="2" charset="0"/>
+              </a:rPr>
               <a:t>   "</a:t>
             </a:r>
             <a:r>
-              <a:rPr lang="en-US" sz="2400" dirty="0" err="1"/>
+              <a:rPr lang="en-US" sz="2400" dirty="0" err="1">
+                <a:latin typeface="Courier" pitchFamily="2" charset="0"/>
+              </a:rPr>
               <a:t>weatherdemo</a:t>
             </a:r>
             <a:r>
-              <a:rPr lang="en-US" sz="2400" dirty="0"/>
-              <a:t>-app");   // key-value pair identifying us</a:t>
+              <a:rPr lang="en-US" sz="2400" dirty="0">
+                <a:latin typeface="Courier" pitchFamily="2" charset="0"/>
+              </a:rPr>
+              <a:t>-app");   </a:t>
+            </a:r>
+            <a:br>
+              <a:rPr lang="en-US" sz="2400" dirty="0">
+                <a:latin typeface="Courier" pitchFamily="2" charset="0"/>
+              </a:rPr>
+            </a:br>
+            <a:r>
+              <a:rPr lang="en-US" sz="2400" dirty="0">
+                <a:latin typeface="Courier" pitchFamily="2" charset="0"/>
+              </a:rPr>
+              <a:t>// key-value pair identifying us</a:t>
             </a:r>
           </a:p>
           <a:p>
             <a:pPr marL="0" indent="0">
               <a:buNone/>
             </a:pPr>
-            <a:endParaRPr lang="en-US" sz="2400" dirty="0"/>
+            <a:endParaRPr lang="en-US" sz="2400" dirty="0">
+              <a:latin typeface="Courier" pitchFamily="2" charset="0"/>
+            </a:endParaRPr>
           </a:p>
           <a:p>
             <a:pPr marL="0" indent="0">
               <a:buNone/>
             </a:pPr>
             <a:r>
-              <a:rPr lang="en-US" sz="2400" dirty="0" err="1"/>
+              <a:rPr lang="en-US" sz="2400" dirty="0" err="1">
+                <a:latin typeface="Courier" pitchFamily="2" charset="0"/>
+              </a:rPr>
               <a:t>connection.setRequestMethod</a:t>
             </a:r>
             <a:r>
-              <a:rPr lang="en-US" sz="2400" dirty="0"/>
+              <a:rPr lang="en-US" sz="2400" dirty="0">
+                <a:latin typeface="Courier" pitchFamily="2" charset="0"/>
+              </a:rPr>
               <a:t>("GET"); </a:t>
             </a:r>
           </a:p>
@@ -5942,18 +6047,24 @@
             <a:pPr marL="0" indent="0">
               <a:buNone/>
             </a:pPr>
-            <a:endParaRPr lang="en-US" sz="2400" dirty="0"/>
+            <a:endParaRPr lang="en-US" sz="2400" dirty="0">
+              <a:latin typeface="Courier" pitchFamily="2" charset="0"/>
+            </a:endParaRPr>
           </a:p>
           <a:p>
             <a:pPr marL="0" indent="0">
               <a:buNone/>
             </a:pPr>
             <a:r>
-              <a:rPr lang="en-US" sz="2400" dirty="0" err="1"/>
+              <a:rPr lang="en-US" sz="2400" dirty="0" err="1">
+                <a:latin typeface="Courier" pitchFamily="2" charset="0"/>
+              </a:rPr>
               <a:t>connection.connect</a:t>
             </a:r>
             <a:r>
-              <a:rPr lang="en-US" sz="2400" dirty="0"/>
+              <a:rPr lang="en-US" sz="2400" dirty="0">
+                <a:latin typeface="Courier" pitchFamily="2" charset="0"/>
+              </a:rPr>
               <a:t>();</a:t>
             </a:r>
           </a:p>
@@ -5961,26 +6072,36 @@
             <a:pPr marL="0" indent="0">
               <a:buNone/>
             </a:pPr>
-            <a:endParaRPr lang="en-US" sz="2400" dirty="0"/>
+            <a:endParaRPr lang="en-US" sz="2400" dirty="0">
+              <a:latin typeface="Courier" pitchFamily="2" charset="0"/>
+            </a:endParaRPr>
           </a:p>
           <a:p>
             <a:pPr marL="0" indent="0">
               <a:buNone/>
             </a:pPr>
             <a:r>
-              <a:rPr lang="en-US" sz="2400" dirty="0" err="1"/>
+              <a:rPr lang="en-US" sz="2400" dirty="0" err="1">
+                <a:latin typeface="Courier" pitchFamily="2" charset="0"/>
+              </a:rPr>
               <a:t>InputStream</a:t>
             </a:r>
             <a:r>
-              <a:rPr lang="en-US" sz="2400" dirty="0"/>
+              <a:rPr lang="en-US" sz="2400" dirty="0">
+                <a:latin typeface="Courier" pitchFamily="2" charset="0"/>
+              </a:rPr>
               <a:t> in = </a:t>
             </a:r>
             <a:r>
-              <a:rPr lang="en-US" sz="2400" dirty="0" err="1"/>
+              <a:rPr lang="en-US" sz="2400" dirty="0" err="1">
+                <a:latin typeface="Courier" pitchFamily="2" charset="0"/>
+              </a:rPr>
               <a:t>connection.getInputStream</a:t>
             </a:r>
             <a:r>
-              <a:rPr lang="en-US" sz="2400" dirty="0"/>
+              <a:rPr lang="en-US" sz="2400" dirty="0">
+                <a:latin typeface="Courier" pitchFamily="2" charset="0"/>
+              </a:rPr>
               <a:t>();</a:t>
             </a:r>
           </a:p>

</xml_diff>